<commit_message>
Added Poster and StoryApp
</commit_message>
<xml_diff>
--- a/FinalPoster.pptx
+++ b/FinalPoster.pptx
@@ -4398,7 +4398,23 @@
                   <a:srgbClr val="A6A6A6"/>
                 </a:solidFill>
               </a:rPr>
-              <a:t>Mapping Emotional Landscapes of Fiction using Machine Learning Techniques</a:t>
+              <a:t>Mapping Emotional Landscapes of </a:t>
+            </a:r>
+            <a:r>
+              <a:rPr lang="en-US" sz="6000" smtClean="0">
+                <a:solidFill>
+                  <a:srgbClr val="A6A6A6"/>
+                </a:solidFill>
+              </a:rPr>
+              <a:t>Fiction Using </a:t>
+            </a:r>
+            <a:r>
+              <a:rPr lang="en-US" sz="6000" dirty="0" smtClean="0">
+                <a:solidFill>
+                  <a:srgbClr val="A6A6A6"/>
+                </a:solidFill>
+              </a:rPr>
+              <a:t>Machine Learning Techniques</a:t>
             </a:r>
           </a:p>
           <a:p>

</xml_diff>